<commit_message>
a major changes in presentation flow: adding back the enrollment and recertification processes
</commit_message>
<xml_diff>
--- a/figures/WHAMP_FlowDiagram.pptx
+++ b/figures/WHAMP_FlowDiagram.pptx
@@ -202,7 +202,7 @@
           <a:p>
             <a:fld id="{ADB5050D-5D68-1347-85A3-B3BE3162EAB7}" type="datetimeFigureOut">
               <a:rPr lang="en-US" smtClean="0"/>
-              <a:t>1/12/19</a:t>
+              <a:t>1/18/19</a:t>
             </a:fld>
             <a:endParaRPr lang="en-US"/>
           </a:p>
@@ -598,7 +598,7 @@
           <a:p>
             <a:fld id="{F5921A1B-DB67-384C-9576-E87AA14871FA}" type="datetimeFigureOut">
               <a:rPr lang="en-US" smtClean="0"/>
-              <a:t>1/12/19</a:t>
+              <a:t>1/18/19</a:t>
             </a:fld>
             <a:endParaRPr lang="en-US"/>
           </a:p>
@@ -766,7 +766,7 @@
           <a:p>
             <a:fld id="{F5921A1B-DB67-384C-9576-E87AA14871FA}" type="datetimeFigureOut">
               <a:rPr lang="en-US" smtClean="0"/>
-              <a:t>1/12/19</a:t>
+              <a:t>1/18/19</a:t>
             </a:fld>
             <a:endParaRPr lang="en-US"/>
           </a:p>
@@ -944,7 +944,7 @@
           <a:p>
             <a:fld id="{F5921A1B-DB67-384C-9576-E87AA14871FA}" type="datetimeFigureOut">
               <a:rPr lang="en-US" smtClean="0"/>
-              <a:t>1/12/19</a:t>
+              <a:t>1/18/19</a:t>
             </a:fld>
             <a:endParaRPr lang="en-US"/>
           </a:p>
@@ -1112,7 +1112,7 @@
           <a:p>
             <a:fld id="{F5921A1B-DB67-384C-9576-E87AA14871FA}" type="datetimeFigureOut">
               <a:rPr lang="en-US" smtClean="0"/>
-              <a:t>1/12/19</a:t>
+              <a:t>1/18/19</a:t>
             </a:fld>
             <a:endParaRPr lang="en-US"/>
           </a:p>
@@ -1357,7 +1357,7 @@
           <a:p>
             <a:fld id="{F5921A1B-DB67-384C-9576-E87AA14871FA}" type="datetimeFigureOut">
               <a:rPr lang="en-US" smtClean="0"/>
-              <a:t>1/12/19</a:t>
+              <a:t>1/18/19</a:t>
             </a:fld>
             <a:endParaRPr lang="en-US"/>
           </a:p>
@@ -1586,7 +1586,7 @@
           <a:p>
             <a:fld id="{F5921A1B-DB67-384C-9576-E87AA14871FA}" type="datetimeFigureOut">
               <a:rPr lang="en-US" smtClean="0"/>
-              <a:t>1/12/19</a:t>
+              <a:t>1/18/19</a:t>
             </a:fld>
             <a:endParaRPr lang="en-US"/>
           </a:p>
@@ -1950,7 +1950,7 @@
           <a:p>
             <a:fld id="{F5921A1B-DB67-384C-9576-E87AA14871FA}" type="datetimeFigureOut">
               <a:rPr lang="en-US" smtClean="0"/>
-              <a:t>1/12/19</a:t>
+              <a:t>1/18/19</a:t>
             </a:fld>
             <a:endParaRPr lang="en-US"/>
           </a:p>
@@ -2067,7 +2067,7 @@
           <a:p>
             <a:fld id="{F5921A1B-DB67-384C-9576-E87AA14871FA}" type="datetimeFigureOut">
               <a:rPr lang="en-US" smtClean="0"/>
-              <a:t>1/12/19</a:t>
+              <a:t>1/18/19</a:t>
             </a:fld>
             <a:endParaRPr lang="en-US"/>
           </a:p>
@@ -2162,7 +2162,7 @@
           <a:p>
             <a:fld id="{F5921A1B-DB67-384C-9576-E87AA14871FA}" type="datetimeFigureOut">
               <a:rPr lang="en-US" smtClean="0"/>
-              <a:t>1/12/19</a:t>
+              <a:t>1/18/19</a:t>
             </a:fld>
             <a:endParaRPr lang="en-US"/>
           </a:p>
@@ -2437,7 +2437,7 @@
           <a:p>
             <a:fld id="{F5921A1B-DB67-384C-9576-E87AA14871FA}" type="datetimeFigureOut">
               <a:rPr lang="en-US" smtClean="0"/>
-              <a:t>1/12/19</a:t>
+              <a:t>1/18/19</a:t>
             </a:fld>
             <a:endParaRPr lang="en-US"/>
           </a:p>
@@ -2689,7 +2689,7 @@
           <a:p>
             <a:fld id="{F5921A1B-DB67-384C-9576-E87AA14871FA}" type="datetimeFigureOut">
               <a:rPr lang="en-US" smtClean="0"/>
-              <a:t>1/12/19</a:t>
+              <a:t>1/18/19</a:t>
             </a:fld>
             <a:endParaRPr lang="en-US"/>
           </a:p>
@@ -2900,7 +2900,7 @@
           <a:p>
             <a:fld id="{F5921A1B-DB67-384C-9576-E87AA14871FA}" type="datetimeFigureOut">
               <a:rPr lang="en-US" smtClean="0"/>
-              <a:t>1/12/19</a:t>
+              <a:t>1/18/19</a:t>
             </a:fld>
             <a:endParaRPr lang="en-US"/>
           </a:p>
@@ -3550,7 +3550,7 @@
         </p:nvSpPr>
         <p:spPr>
           <a:xfrm>
-            <a:off x="4206949" y="1300767"/>
+            <a:off x="4279193" y="1235478"/>
             <a:ext cx="3204510" cy="2135361"/>
           </a:xfrm>
           <a:prstGeom prst="roundRect">
@@ -3765,8 +3765,8 @@
           <p:nvCxnSpPr>
             <p:cNvPr id="38" name="Elbow Connector 37"/>
             <p:cNvCxnSpPr>
+              <a:cxnSpLocks/>
               <a:stCxn id="37" idx="0"/>
-              <a:endCxn id="50" idx="2"/>
             </p:cNvCxnSpPr>
             <p:nvPr/>
           </p:nvCxnSpPr>
@@ -4059,86 +4059,17 @@
         </p:nvGrpSpPr>
         <p:grpSpPr>
           <a:xfrm>
-            <a:off x="4476334" y="1876679"/>
-            <a:ext cx="3022060" cy="1331284"/>
-            <a:chOff x="2027936" y="1870148"/>
-            <a:chExt cx="3022060" cy="1331284"/>
+            <a:off x="4567773" y="1876679"/>
+            <a:ext cx="2930621" cy="1331284"/>
+            <a:chOff x="2119375" y="1870148"/>
+            <a:chExt cx="2930621" cy="1331284"/>
           </a:xfrm>
         </p:grpSpPr>
-        <p:sp>
-          <p:nvSpPr>
-            <p:cNvPr id="50" name="Oval 49"/>
-            <p:cNvSpPr/>
-            <p:nvPr/>
-          </p:nvSpPr>
-          <p:spPr>
-            <a:xfrm>
-              <a:off x="2027936" y="2536273"/>
-              <a:ext cx="182880" cy="182880"/>
-            </a:xfrm>
-            <a:prstGeom prst="ellipse">
-              <a:avLst/>
-            </a:prstGeom>
-            <a:solidFill>
-              <a:srgbClr val="8FB08C">
-                <a:lumMod val="60000"/>
-                <a:lumOff val="40000"/>
-              </a:srgbClr>
-            </a:solidFill>
-            <a:ln w="25400" cap="flat" cmpd="sng" algn="ctr">
-              <a:solidFill>
-                <a:srgbClr val="8FB08C">
-                  <a:lumMod val="50000"/>
-                </a:srgbClr>
-              </a:solidFill>
-              <a:prstDash val="solid"/>
-            </a:ln>
-            <a:effectLst/>
-          </p:spPr>
-          <p:txBody>
-            <a:bodyPr rtlCol="0" anchor="ctr"/>
-            <a:lstStyle/>
-            <a:p>
-              <a:pPr marL="0" marR="0" lvl="0" indent="0" algn="ctr" defTabSz="914400" eaLnBrk="1" fontAlgn="auto" latinLnBrk="0" hangingPunct="1">
-                <a:lnSpc>
-                  <a:spcPct val="100000"/>
-                </a:lnSpc>
-                <a:spcBef>
-                  <a:spcPts val="0"/>
-                </a:spcBef>
-                <a:spcAft>
-                  <a:spcPts val="0"/>
-                </a:spcAft>
-                <a:buClrTx/>
-                <a:buSzTx/>
-                <a:buFontTx/>
-                <a:buNone/>
-                <a:tabLst/>
-                <a:defRPr/>
-              </a:pPr>
-              <a:endParaRPr kumimoji="0" lang="en-US" sz="1800" b="0" i="0" u="none" strike="noStrike" kern="0" cap="none" spc="0" normalizeH="0" baseline="0" noProof="0">
-                <a:ln>
-                  <a:noFill/>
-                </a:ln>
-                <a:solidFill>
-                  <a:prstClr val="white"/>
-                </a:solidFill>
-                <a:effectLst/>
-                <a:uLnTx/>
-                <a:uFillTx/>
-                <a:latin typeface="Arial"/>
-                <a:ea typeface=""/>
-                <a:cs typeface=""/>
-              </a:endParaRPr>
-            </a:p>
-          </p:txBody>
-        </p:sp>
         <p:cxnSp>
           <p:nvCxnSpPr>
             <p:cNvPr id="51" name="Elbow Connector 50"/>
             <p:cNvCxnSpPr>
-              <a:stCxn id="50" idx="0"/>
-              <a:endCxn id="60" idx="2"/>
+              <a:cxnSpLocks/>
             </p:cNvCxnSpPr>
             <p:nvPr/>
           </p:nvCxnSpPr>
@@ -4223,7 +4154,7 @@
           <p:nvCxnSpPr>
             <p:cNvPr id="53" name="Elbow Connector 52"/>
             <p:cNvCxnSpPr>
-              <a:stCxn id="50" idx="4"/>
+              <a:cxnSpLocks/>
               <a:endCxn id="83" idx="1"/>
             </p:cNvCxnSpPr>
             <p:nvPr/>
@@ -4368,7 +4299,7 @@
         </p:nvSpPr>
         <p:spPr>
           <a:xfrm>
-            <a:off x="7498395" y="1544710"/>
+            <a:off x="6090147" y="1990363"/>
             <a:ext cx="1572063" cy="276999"/>
           </a:xfrm>
           <a:prstGeom prst="rect">
@@ -4398,421 +4329,6 @@
             <a:r>
               <a:rPr lang="en-US" sz="1200" dirty="0"/>
               <a:t>Enrolled in ADAP</a:t>
-            </a:r>
-          </a:p>
-        </p:txBody>
-      </p:sp>
-      <p:grpSp>
-        <p:nvGrpSpPr>
-          <p:cNvPr id="59" name="Group 58"/>
-          <p:cNvGrpSpPr/>
-          <p:nvPr/>
-        </p:nvGrpSpPr>
-        <p:grpSpPr>
-          <a:xfrm>
-            <a:off x="6090147" y="1439033"/>
-            <a:ext cx="1426177" cy="1481331"/>
-            <a:chOff x="2027936" y="1937883"/>
-            <a:chExt cx="1426177" cy="1481331"/>
-          </a:xfrm>
-        </p:grpSpPr>
-        <p:sp>
-          <p:nvSpPr>
-            <p:cNvPr id="60" name="Oval 59"/>
-            <p:cNvSpPr/>
-            <p:nvPr/>
-          </p:nvSpPr>
-          <p:spPr>
-            <a:xfrm>
-              <a:off x="2027936" y="2536273"/>
-              <a:ext cx="182880" cy="182880"/>
-            </a:xfrm>
-            <a:prstGeom prst="ellipse">
-              <a:avLst/>
-            </a:prstGeom>
-            <a:solidFill>
-              <a:srgbClr val="8FB08C">
-                <a:lumMod val="60000"/>
-                <a:lumOff val="40000"/>
-              </a:srgbClr>
-            </a:solidFill>
-            <a:ln w="25400" cap="flat" cmpd="sng" algn="ctr">
-              <a:solidFill>
-                <a:srgbClr val="8FB08C">
-                  <a:lumMod val="50000"/>
-                </a:srgbClr>
-              </a:solidFill>
-              <a:prstDash val="solid"/>
-            </a:ln>
-            <a:effectLst/>
-          </p:spPr>
-          <p:txBody>
-            <a:bodyPr rtlCol="0" anchor="ctr"/>
-            <a:lstStyle/>
-            <a:p>
-              <a:pPr marL="0" marR="0" lvl="0" indent="0" algn="ctr" defTabSz="914400" eaLnBrk="1" fontAlgn="auto" latinLnBrk="0" hangingPunct="1">
-                <a:lnSpc>
-                  <a:spcPct val="100000"/>
-                </a:lnSpc>
-                <a:spcBef>
-                  <a:spcPts val="0"/>
-                </a:spcBef>
-                <a:spcAft>
-                  <a:spcPts val="0"/>
-                </a:spcAft>
-                <a:buClrTx/>
-                <a:buSzTx/>
-                <a:buFontTx/>
-                <a:buNone/>
-                <a:tabLst/>
-                <a:defRPr/>
-              </a:pPr>
-              <a:endParaRPr kumimoji="0" lang="en-US" sz="1800" b="0" i="0" u="none" strike="noStrike" kern="0" cap="none" spc="0" normalizeH="0" baseline="0" noProof="0">
-                <a:ln>
-                  <a:noFill/>
-                </a:ln>
-                <a:solidFill>
-                  <a:prstClr val="white"/>
-                </a:solidFill>
-                <a:effectLst/>
-                <a:uLnTx/>
-                <a:uFillTx/>
-                <a:latin typeface="Arial"/>
-                <a:ea typeface=""/>
-                <a:cs typeface=""/>
-              </a:endParaRPr>
-            </a:p>
-          </p:txBody>
-        </p:sp>
-        <p:cxnSp>
-          <p:nvCxnSpPr>
-            <p:cNvPr id="61" name="Elbow Connector 60"/>
-            <p:cNvCxnSpPr>
-              <a:stCxn id="60" idx="0"/>
-              <a:endCxn id="79" idx="1"/>
-            </p:cNvCxnSpPr>
-            <p:nvPr/>
-          </p:nvCxnSpPr>
-          <p:spPr>
-            <a:xfrm rot="5400000" flipH="1" flipV="1">
-              <a:off x="2609638" y="1691799"/>
-              <a:ext cx="354213" cy="1334737"/>
-            </a:xfrm>
-            <a:prstGeom prst="bentConnector2">
-              <a:avLst/>
-            </a:prstGeom>
-            <a:noFill/>
-            <a:ln w="28575" cap="flat" cmpd="sng" algn="ctr">
-              <a:solidFill>
-                <a:sysClr val="windowText" lastClr="000000">
-                  <a:lumMod val="75000"/>
-                  <a:lumOff val="25000"/>
-                </a:sysClr>
-              </a:solidFill>
-              <a:prstDash val="solid"/>
-            </a:ln>
-            <a:effectLst/>
-          </p:spPr>
-        </p:cxnSp>
-        <p:sp>
-          <p:nvSpPr>
-            <p:cNvPr id="62" name="TextBox 61"/>
-            <p:cNvSpPr txBox="1"/>
-            <p:nvPr/>
-          </p:nvSpPr>
-          <p:spPr>
-            <a:xfrm>
-              <a:off x="2186129" y="1937883"/>
-              <a:ext cx="1257952" cy="276999"/>
-            </a:xfrm>
-            <a:prstGeom prst="rect">
-              <a:avLst/>
-            </a:prstGeom>
-            <a:noFill/>
-          </p:spPr>
-          <p:txBody>
-            <a:bodyPr wrap="square" rtlCol="0">
-              <a:spAutoFit/>
-            </a:bodyPr>
-            <a:lstStyle/>
-            <a:p>
-              <a:pPr marL="0" marR="0" lvl="0" indent="0" defTabSz="914400" eaLnBrk="1" fontAlgn="auto" latinLnBrk="0" hangingPunct="1">
-                <a:lnSpc>
-                  <a:spcPct val="100000"/>
-                </a:lnSpc>
-                <a:spcBef>
-                  <a:spcPts val="0"/>
-                </a:spcBef>
-                <a:spcAft>
-                  <a:spcPts val="0"/>
-                </a:spcAft>
-                <a:buClrTx/>
-                <a:buSzTx/>
-                <a:buFontTx/>
-                <a:buNone/>
-                <a:tabLst/>
-                <a:defRPr/>
-              </a:pPr>
-              <a:r>
-                <a:rPr kumimoji="0" lang="en-US" sz="1200" b="0" i="0" u="none" strike="noStrike" kern="0" cap="none" spc="0" normalizeH="0" baseline="0" noProof="0" dirty="0">
-                  <a:ln>
-                    <a:noFill/>
-                  </a:ln>
-                  <a:solidFill>
-                    <a:prstClr val="black"/>
-                  </a:solidFill>
-                  <a:effectLst/>
-                  <a:uLnTx/>
-                  <a:uFillTx/>
-                </a:rPr>
-                <a:t>Enroll in ADAP</a:t>
-              </a:r>
-            </a:p>
-          </p:txBody>
-        </p:sp>
-        <p:cxnSp>
-          <p:nvCxnSpPr>
-            <p:cNvPr id="63" name="Elbow Connector 62"/>
-            <p:cNvCxnSpPr>
-              <a:stCxn id="60" idx="4"/>
-              <a:endCxn id="81" idx="1"/>
-            </p:cNvCxnSpPr>
-            <p:nvPr/>
-          </p:nvCxnSpPr>
-          <p:spPr>
-            <a:xfrm rot="16200000" flipH="1">
-              <a:off x="2570810" y="2267719"/>
-              <a:ext cx="413941" cy="1316808"/>
-            </a:xfrm>
-            <a:prstGeom prst="bentConnector2">
-              <a:avLst/>
-            </a:prstGeom>
-            <a:noFill/>
-            <a:ln w="28575" cap="flat" cmpd="sng" algn="ctr">
-              <a:solidFill>
-                <a:sysClr val="windowText" lastClr="000000">
-                  <a:lumMod val="75000"/>
-                  <a:lumOff val="25000"/>
-                </a:sysClr>
-              </a:solidFill>
-              <a:prstDash val="solid"/>
-            </a:ln>
-            <a:effectLst/>
-          </p:spPr>
-        </p:cxnSp>
-        <p:sp>
-          <p:nvSpPr>
-            <p:cNvPr id="64" name="TextBox 63"/>
-            <p:cNvSpPr txBox="1"/>
-            <p:nvPr/>
-          </p:nvSpPr>
-          <p:spPr>
-            <a:xfrm>
-              <a:off x="2175540" y="2873635"/>
-              <a:ext cx="1096987" cy="276999"/>
-            </a:xfrm>
-            <a:prstGeom prst="rect">
-              <a:avLst/>
-            </a:prstGeom>
-            <a:noFill/>
-          </p:spPr>
-          <p:txBody>
-            <a:bodyPr wrap="square" rtlCol="0">
-              <a:spAutoFit/>
-            </a:bodyPr>
-            <a:lstStyle/>
-            <a:p>
-              <a:pPr marL="0" marR="0" lvl="0" indent="0" defTabSz="914400" eaLnBrk="1" fontAlgn="auto" latinLnBrk="0" hangingPunct="1">
-                <a:lnSpc>
-                  <a:spcPct val="100000"/>
-                </a:lnSpc>
-                <a:spcBef>
-                  <a:spcPts val="0"/>
-                </a:spcBef>
-                <a:spcAft>
-                  <a:spcPts val="0"/>
-                </a:spcAft>
-                <a:buClrTx/>
-                <a:buSzTx/>
-                <a:buFontTx/>
-                <a:buNone/>
-                <a:tabLst/>
-                <a:defRPr/>
-              </a:pPr>
-              <a:r>
-                <a:rPr kumimoji="0" lang="en-US" sz="1200" b="0" i="0" u="none" strike="noStrike" kern="0" cap="none" spc="0" normalizeH="0" baseline="0" noProof="0" dirty="0">
-                  <a:ln>
-                    <a:noFill/>
-                  </a:ln>
-                  <a:solidFill>
-                    <a:prstClr val="black"/>
-                  </a:solidFill>
-                  <a:effectLst/>
-                  <a:uLnTx/>
-                  <a:uFillTx/>
-                </a:rPr>
-                <a:t>Don’t enroll</a:t>
-              </a:r>
-            </a:p>
-          </p:txBody>
-        </p:sp>
-        <p:sp>
-          <p:nvSpPr>
-            <p:cNvPr id="65" name="TextBox 64"/>
-            <p:cNvSpPr txBox="1"/>
-            <p:nvPr/>
-          </p:nvSpPr>
-          <p:spPr>
-            <a:xfrm>
-              <a:off x="2274221" y="2146933"/>
-              <a:ext cx="663617" cy="307777"/>
-            </a:xfrm>
-            <a:prstGeom prst="rect">
-              <a:avLst/>
-            </a:prstGeom>
-            <a:noFill/>
-          </p:spPr>
-          <p:txBody>
-            <a:bodyPr wrap="square" rtlCol="0">
-              <a:spAutoFit/>
-            </a:bodyPr>
-            <a:lstStyle/>
-            <a:p>
-              <a:pPr marL="0" marR="0" lvl="0" indent="0" algn="ctr" defTabSz="914400" eaLnBrk="1" fontAlgn="auto" latinLnBrk="0" hangingPunct="1">
-                <a:lnSpc>
-                  <a:spcPct val="100000"/>
-                </a:lnSpc>
-                <a:spcBef>
-                  <a:spcPts val="0"/>
-                </a:spcBef>
-                <a:spcAft>
-                  <a:spcPts val="0"/>
-                </a:spcAft>
-                <a:buClrTx/>
-                <a:buSzTx/>
-                <a:buFontTx/>
-                <a:buNone/>
-                <a:tabLst/>
-                <a:defRPr/>
-              </a:pPr>
-              <a:r>
-                <a:rPr lang="en-US" sz="1400" b="1" i="1" kern="0" dirty="0"/>
-                <a:t>q</a:t>
-              </a:r>
-              <a:endParaRPr kumimoji="0" lang="en-US" sz="1400" b="1" i="1" u="none" strike="noStrike" kern="0" cap="none" spc="0" normalizeH="0" baseline="0" noProof="0" dirty="0">
-                <a:ln>
-                  <a:noFill/>
-                </a:ln>
-                <a:effectLst/>
-                <a:uLnTx/>
-                <a:uFillTx/>
-              </a:endParaRPr>
-            </a:p>
-          </p:txBody>
-        </p:sp>
-        <p:sp>
-          <p:nvSpPr>
-            <p:cNvPr id="66" name="TextBox 65"/>
-            <p:cNvSpPr txBox="1"/>
-            <p:nvPr/>
-          </p:nvSpPr>
-          <p:spPr>
-            <a:xfrm>
-              <a:off x="2277368" y="3111437"/>
-              <a:ext cx="663617" cy="307777"/>
-            </a:xfrm>
-            <a:prstGeom prst="rect">
-              <a:avLst/>
-            </a:prstGeom>
-            <a:noFill/>
-          </p:spPr>
-          <p:txBody>
-            <a:bodyPr wrap="square" rtlCol="0">
-              <a:spAutoFit/>
-            </a:bodyPr>
-            <a:lstStyle/>
-            <a:p>
-              <a:pPr marL="0" marR="0" lvl="0" indent="0" algn="ctr" defTabSz="914400" eaLnBrk="1" fontAlgn="auto" latinLnBrk="0" hangingPunct="1">
-                <a:lnSpc>
-                  <a:spcPct val="100000"/>
-                </a:lnSpc>
-                <a:spcBef>
-                  <a:spcPts val="0"/>
-                </a:spcBef>
-                <a:spcAft>
-                  <a:spcPts val="0"/>
-                </a:spcAft>
-                <a:buClrTx/>
-                <a:buSzTx/>
-                <a:buFontTx/>
-                <a:buNone/>
-                <a:tabLst/>
-                <a:defRPr/>
-              </a:pPr>
-              <a:r>
-                <a:rPr kumimoji="0" lang="en-US" sz="1400" b="1" i="0" u="none" strike="noStrike" kern="0" cap="none" spc="0" normalizeH="0" baseline="0" noProof="0" dirty="0">
-                  <a:ln>
-                    <a:noFill/>
-                  </a:ln>
-                  <a:effectLst/>
-                  <a:uLnTx/>
-                  <a:uFillTx/>
-                </a:rPr>
-                <a:t>1 - </a:t>
-              </a:r>
-              <a:r>
-                <a:rPr kumimoji="0" lang="en-US" sz="1400" b="1" i="1" u="none" strike="noStrike" kern="0" cap="none" spc="0" normalizeH="0" baseline="0" noProof="0" dirty="0">
-                  <a:ln>
-                    <a:noFill/>
-                  </a:ln>
-                  <a:effectLst/>
-                  <a:uLnTx/>
-                  <a:uFillTx/>
-                </a:rPr>
-                <a:t>q</a:t>
-              </a:r>
-            </a:p>
-          </p:txBody>
-        </p:sp>
-      </p:grpSp>
-      <p:sp>
-        <p:nvSpPr>
-          <p:cNvPr id="81" name="TextBox 80"/>
-          <p:cNvSpPr txBox="1"/>
-          <p:nvPr/>
-        </p:nvSpPr>
-        <p:spPr>
-          <a:xfrm>
-            <a:off x="7498395" y="2495744"/>
-            <a:ext cx="1572063" cy="276999"/>
-          </a:xfrm>
-          <a:prstGeom prst="rect">
-            <a:avLst/>
-          </a:prstGeom>
-          <a:solidFill>
-            <a:schemeClr val="accent2">
-              <a:lumMod val="40000"/>
-              <a:lumOff val="60000"/>
-            </a:schemeClr>
-          </a:solidFill>
-          <a:ln>
-            <a:solidFill>
-              <a:schemeClr val="accent2">
-                <a:lumMod val="50000"/>
-              </a:schemeClr>
-            </a:solidFill>
-          </a:ln>
-        </p:spPr>
-        <p:txBody>
-          <a:bodyPr wrap="square" rtlCol="0">
-            <a:spAutoFit/>
-          </a:bodyPr>
-          <a:lstStyle/>
-          <a:p>
-            <a:pPr algn="ctr"/>
-            <a:r>
-              <a:rPr lang="en-US" sz="1200" dirty="0"/>
-              <a:t>Not enrolled in ADAP</a:t>
             </a:r>
           </a:p>
         </p:txBody>
@@ -5413,6 +4929,63 @@
           </a:p>
         </p:txBody>
       </p:sp>
+      <p:sp>
+        <p:nvSpPr>
+          <p:cNvPr id="56" name="Rectangle 55">
+            <a:extLst>
+              <a:ext uri="{FF2B5EF4-FFF2-40B4-BE49-F238E27FC236}">
+                <a16:creationId xmlns:a16="http://schemas.microsoft.com/office/drawing/2014/main" id="{D3A7D3A7-9442-D143-8585-B6B84EC27049}"/>
+              </a:ext>
+            </a:extLst>
+          </p:cNvPr>
+          <p:cNvSpPr/>
+          <p:nvPr/>
+        </p:nvSpPr>
+        <p:spPr>
+          <a:xfrm>
+            <a:off x="4471463" y="2542137"/>
+            <a:ext cx="183613" cy="182880"/>
+          </a:xfrm>
+          <a:prstGeom prst="rect">
+            <a:avLst/>
+          </a:prstGeom>
+          <a:solidFill>
+            <a:schemeClr val="accent1">
+              <a:lumMod val="60000"/>
+              <a:lumOff val="40000"/>
+            </a:schemeClr>
+          </a:solidFill>
+          <a:ln w="28575">
+            <a:solidFill>
+              <a:schemeClr val="tx2"/>
+            </a:solidFill>
+          </a:ln>
+        </p:spPr>
+        <p:style>
+          <a:lnRef idx="2">
+            <a:schemeClr val="accent1">
+              <a:shade val="50000"/>
+            </a:schemeClr>
+          </a:lnRef>
+          <a:fillRef idx="1">
+            <a:schemeClr val="accent1"/>
+          </a:fillRef>
+          <a:effectRef idx="0">
+            <a:schemeClr val="accent1"/>
+          </a:effectRef>
+          <a:fontRef idx="minor">
+            <a:schemeClr val="lt1"/>
+          </a:fontRef>
+        </p:style>
+        <p:txBody>
+          <a:bodyPr rtlCol="0" anchor="ctr"/>
+          <a:lstStyle/>
+          <a:p>
+            <a:pPr algn="ctr"/>
+            <a:endParaRPr lang="en-US"/>
+          </a:p>
+        </p:txBody>
+      </p:sp>
     </p:spTree>
     <p:extLst>
       <p:ext uri="{BB962C8B-B14F-4D97-AF65-F5344CB8AC3E}">
@@ -5715,7 +5288,7 @@
         </p:nvSpPr>
         <p:spPr>
           <a:xfrm>
-            <a:off x="3042061" y="1300767"/>
+            <a:off x="3075890" y="1340476"/>
             <a:ext cx="3385677" cy="2792815"/>
           </a:xfrm>
           <a:prstGeom prst="roundRect">
@@ -5930,8 +5503,8 @@
           <p:nvCxnSpPr>
             <p:cNvPr id="38" name="Elbow Connector 37"/>
             <p:cNvCxnSpPr>
+              <a:cxnSpLocks/>
               <a:stCxn id="37" idx="0"/>
-              <a:endCxn id="50" idx="2"/>
             </p:cNvCxnSpPr>
             <p:nvPr/>
           </p:nvCxnSpPr>
@@ -6263,85 +5836,17 @@
         </p:nvGrpSpPr>
         <p:grpSpPr>
           <a:xfrm>
-            <a:off x="4816983" y="1876679"/>
-            <a:ext cx="2006059" cy="1331284"/>
-            <a:chOff x="2027936" y="1870148"/>
-            <a:chExt cx="2006059" cy="1331284"/>
+            <a:off x="4908423" y="1876679"/>
+            <a:ext cx="1914619" cy="1331284"/>
+            <a:chOff x="2119376" y="1870148"/>
+            <a:chExt cx="1914619" cy="1331284"/>
           </a:xfrm>
         </p:grpSpPr>
-        <p:sp>
-          <p:nvSpPr>
-            <p:cNvPr id="50" name="Oval 49"/>
-            <p:cNvSpPr/>
-            <p:nvPr/>
-          </p:nvSpPr>
-          <p:spPr>
-            <a:xfrm>
-              <a:off x="2027936" y="2536273"/>
-              <a:ext cx="182880" cy="182880"/>
-            </a:xfrm>
-            <a:prstGeom prst="ellipse">
-              <a:avLst/>
-            </a:prstGeom>
-            <a:solidFill>
-              <a:srgbClr val="8FB08C">
-                <a:lumMod val="60000"/>
-                <a:lumOff val="40000"/>
-              </a:srgbClr>
-            </a:solidFill>
-            <a:ln w="25400" cap="flat" cmpd="sng" algn="ctr">
-              <a:solidFill>
-                <a:srgbClr val="8FB08C">
-                  <a:lumMod val="50000"/>
-                </a:srgbClr>
-              </a:solidFill>
-              <a:prstDash val="solid"/>
-            </a:ln>
-            <a:effectLst/>
-          </p:spPr>
-          <p:txBody>
-            <a:bodyPr rtlCol="0" anchor="ctr"/>
-            <a:lstStyle/>
-            <a:p>
-              <a:pPr marL="0" marR="0" lvl="0" indent="0" algn="ctr" defTabSz="914400" eaLnBrk="1" fontAlgn="auto" latinLnBrk="0" hangingPunct="1">
-                <a:lnSpc>
-                  <a:spcPct val="100000"/>
-                </a:lnSpc>
-                <a:spcBef>
-                  <a:spcPts val="0"/>
-                </a:spcBef>
-                <a:spcAft>
-                  <a:spcPts val="0"/>
-                </a:spcAft>
-                <a:buClrTx/>
-                <a:buSzTx/>
-                <a:buFontTx/>
-                <a:buNone/>
-                <a:tabLst/>
-                <a:defRPr/>
-              </a:pPr>
-              <a:endParaRPr kumimoji="0" lang="en-US" sz="1800" b="0" i="0" u="none" strike="noStrike" kern="0" cap="none" spc="0" normalizeH="0" baseline="0" noProof="0">
-                <a:ln>
-                  <a:noFill/>
-                </a:ln>
-                <a:solidFill>
-                  <a:prstClr val="white"/>
-                </a:solidFill>
-                <a:effectLst/>
-                <a:uLnTx/>
-                <a:uFillTx/>
-                <a:latin typeface="Arial"/>
-                <a:ea typeface=""/>
-                <a:cs typeface=""/>
-              </a:endParaRPr>
-            </a:p>
-          </p:txBody>
-        </p:sp>
         <p:cxnSp>
           <p:nvCxnSpPr>
             <p:cNvPr id="51" name="Elbow Connector 50"/>
             <p:cNvCxnSpPr>
-              <a:stCxn id="50" idx="0"/>
+              <a:cxnSpLocks/>
               <a:endCxn id="79" idx="1"/>
             </p:cNvCxnSpPr>
             <p:nvPr/>
@@ -6427,7 +5932,7 @@
           <p:nvCxnSpPr>
             <p:cNvPr id="53" name="Elbow Connector 52"/>
             <p:cNvCxnSpPr>
-              <a:stCxn id="50" idx="4"/>
+              <a:cxnSpLocks/>
               <a:endCxn id="83" idx="1"/>
             </p:cNvCxnSpPr>
             <p:nvPr/>
@@ -6895,6 +6400,63 @@
           </a:fontRef>
         </p:style>
       </p:cxnSp>
+      <p:sp>
+        <p:nvSpPr>
+          <p:cNvPr id="34" name="Rectangle 33">
+            <a:extLst>
+              <a:ext uri="{FF2B5EF4-FFF2-40B4-BE49-F238E27FC236}">
+                <a16:creationId xmlns:a16="http://schemas.microsoft.com/office/drawing/2014/main" id="{B17F3513-696F-BD4A-A5C0-09ADA44F1528}"/>
+              </a:ext>
+            </a:extLst>
+          </p:cNvPr>
+          <p:cNvSpPr/>
+          <p:nvPr/>
+        </p:nvSpPr>
+        <p:spPr>
+          <a:xfrm>
+            <a:off x="4825300" y="2554004"/>
+            <a:ext cx="183613" cy="182880"/>
+          </a:xfrm>
+          <a:prstGeom prst="rect">
+            <a:avLst/>
+          </a:prstGeom>
+          <a:solidFill>
+            <a:schemeClr val="accent1">
+              <a:lumMod val="60000"/>
+              <a:lumOff val="40000"/>
+            </a:schemeClr>
+          </a:solidFill>
+          <a:ln w="28575">
+            <a:solidFill>
+              <a:schemeClr val="tx2"/>
+            </a:solidFill>
+          </a:ln>
+        </p:spPr>
+        <p:style>
+          <a:lnRef idx="2">
+            <a:schemeClr val="accent1">
+              <a:shade val="50000"/>
+            </a:schemeClr>
+          </a:lnRef>
+          <a:fillRef idx="1">
+            <a:schemeClr val="accent1"/>
+          </a:fillRef>
+          <a:effectRef idx="0">
+            <a:schemeClr val="accent1"/>
+          </a:effectRef>
+          <a:fontRef idx="minor">
+            <a:schemeClr val="lt1"/>
+          </a:fontRef>
+        </p:style>
+        <p:txBody>
+          <a:bodyPr rtlCol="0" anchor="ctr"/>
+          <a:lstStyle/>
+          <a:p>
+            <a:pPr algn="ctr"/>
+            <a:endParaRPr lang="en-US"/>
+          </a:p>
+        </p:txBody>
+      </p:sp>
     </p:spTree>
     <p:extLst>
       <p:ext uri="{BB962C8B-B14F-4D97-AF65-F5344CB8AC3E}">
@@ -6966,10 +6528,10 @@
         </p:nvGrpSpPr>
         <p:grpSpPr>
           <a:xfrm>
-            <a:off x="1665275" y="1300767"/>
-            <a:ext cx="7596103" cy="4582240"/>
-            <a:chOff x="1665275" y="1300767"/>
-            <a:chExt cx="7596103" cy="4582240"/>
+            <a:off x="1665275" y="351721"/>
+            <a:ext cx="7596103" cy="5531286"/>
+            <a:chOff x="1665275" y="351721"/>
+            <a:chExt cx="7596103" cy="5531286"/>
           </a:xfrm>
         </p:grpSpPr>
         <p:sp>
@@ -7060,7 +6622,7 @@
           </p:nvSpPr>
           <p:spPr>
             <a:xfrm>
-              <a:off x="4206949" y="1300767"/>
+              <a:off x="5884118" y="351721"/>
               <a:ext cx="3204510" cy="2135361"/>
             </a:xfrm>
             <a:prstGeom prst="roundRect">

</xml_diff>